<commit_message>
Update Tutorial + Folder Name modification
</commit_message>
<xml_diff>
--- a/LoKy_Documentation/Burn_bootloader.pptx
+++ b/LoKy_Documentation/Burn_bootloader.pptx
@@ -245,7 +245,7 @@
           <a:p>
             <a:fld id="{A45E65DB-E436-46EF-BBE0-98A85AD0FAFA}" type="datetimeFigureOut">
               <a:rPr lang="en-US" smtClean="0"/>
-              <a:t>3/29/2021</a:t>
+              <a:t>4/10/2021</a:t>
             </a:fld>
             <a:endParaRPr lang="en-US"/>
           </a:p>
@@ -415,7 +415,7 @@
           <a:p>
             <a:fld id="{A45E65DB-E436-46EF-BBE0-98A85AD0FAFA}" type="datetimeFigureOut">
               <a:rPr lang="en-US" smtClean="0"/>
-              <a:t>3/29/2021</a:t>
+              <a:t>4/10/2021</a:t>
             </a:fld>
             <a:endParaRPr lang="en-US"/>
           </a:p>
@@ -595,7 +595,7 @@
           <a:p>
             <a:fld id="{A45E65DB-E436-46EF-BBE0-98A85AD0FAFA}" type="datetimeFigureOut">
               <a:rPr lang="en-US" smtClean="0"/>
-              <a:t>3/29/2021</a:t>
+              <a:t>4/10/2021</a:t>
             </a:fld>
             <a:endParaRPr lang="en-US"/>
           </a:p>
@@ -765,7 +765,7 @@
           <a:p>
             <a:fld id="{A45E65DB-E436-46EF-BBE0-98A85AD0FAFA}" type="datetimeFigureOut">
               <a:rPr lang="en-US" smtClean="0"/>
-              <a:t>3/29/2021</a:t>
+              <a:t>4/10/2021</a:t>
             </a:fld>
             <a:endParaRPr lang="en-US"/>
           </a:p>
@@ -1011,7 +1011,7 @@
           <a:p>
             <a:fld id="{A45E65DB-E436-46EF-BBE0-98A85AD0FAFA}" type="datetimeFigureOut">
               <a:rPr lang="en-US" smtClean="0"/>
-              <a:t>3/29/2021</a:t>
+              <a:t>4/10/2021</a:t>
             </a:fld>
             <a:endParaRPr lang="en-US"/>
           </a:p>
@@ -1243,7 +1243,7 @@
           <a:p>
             <a:fld id="{A45E65DB-E436-46EF-BBE0-98A85AD0FAFA}" type="datetimeFigureOut">
               <a:rPr lang="en-US" smtClean="0"/>
-              <a:t>3/29/2021</a:t>
+              <a:t>4/10/2021</a:t>
             </a:fld>
             <a:endParaRPr lang="en-US"/>
           </a:p>
@@ -1610,7 +1610,7 @@
           <a:p>
             <a:fld id="{A45E65DB-E436-46EF-BBE0-98A85AD0FAFA}" type="datetimeFigureOut">
               <a:rPr lang="en-US" smtClean="0"/>
-              <a:t>3/29/2021</a:t>
+              <a:t>4/10/2021</a:t>
             </a:fld>
             <a:endParaRPr lang="en-US"/>
           </a:p>
@@ -1728,7 +1728,7 @@
           <a:p>
             <a:fld id="{A45E65DB-E436-46EF-BBE0-98A85AD0FAFA}" type="datetimeFigureOut">
               <a:rPr lang="en-US" smtClean="0"/>
-              <a:t>3/29/2021</a:t>
+              <a:t>4/10/2021</a:t>
             </a:fld>
             <a:endParaRPr lang="en-US"/>
           </a:p>
@@ -1823,7 +1823,7 @@
           <a:p>
             <a:fld id="{A45E65DB-E436-46EF-BBE0-98A85AD0FAFA}" type="datetimeFigureOut">
               <a:rPr lang="en-US" smtClean="0"/>
-              <a:t>3/29/2021</a:t>
+              <a:t>4/10/2021</a:t>
             </a:fld>
             <a:endParaRPr lang="en-US"/>
           </a:p>
@@ -2100,7 +2100,7 @@
           <a:p>
             <a:fld id="{A45E65DB-E436-46EF-BBE0-98A85AD0FAFA}" type="datetimeFigureOut">
               <a:rPr lang="en-US" smtClean="0"/>
-              <a:t>3/29/2021</a:t>
+              <a:t>4/10/2021</a:t>
             </a:fld>
             <a:endParaRPr lang="en-US"/>
           </a:p>
@@ -2353,7 +2353,7 @@
           <a:p>
             <a:fld id="{A45E65DB-E436-46EF-BBE0-98A85AD0FAFA}" type="datetimeFigureOut">
               <a:rPr lang="en-US" smtClean="0"/>
-              <a:t>3/29/2021</a:t>
+              <a:t>4/10/2021</a:t>
             </a:fld>
             <a:endParaRPr lang="en-US"/>
           </a:p>
@@ -2566,7 +2566,7 @@
           <a:p>
             <a:fld id="{A45E65DB-E436-46EF-BBE0-98A85AD0FAFA}" type="datetimeFigureOut">
               <a:rPr lang="en-US" smtClean="0"/>
-              <a:t>3/29/2021</a:t>
+              <a:t>4/10/2021</a:t>
             </a:fld>
             <a:endParaRPr lang="en-US"/>
           </a:p>
@@ -3193,33 +3193,7 @@
                   <a:effectLst/>
                   <a:latin typeface="Helvetica Neue"/>
                 </a:rPr>
-                <a:t>PART 1 - The </a:t>
-              </a:r>
-              <a:r>
-                <a:rPr kumimoji="0" lang="en-US" altLang="en-US" sz="2200" b="0" i="0" u="none" strike="noStrike" cap="none" normalizeH="0" baseline="0" dirty="0" smtClean="0">
-                  <a:ln>
-                    <a:noFill/>
-                  </a:ln>
-                  <a:solidFill>
-                    <a:srgbClr val="333333"/>
-                  </a:solidFill>
-                  <a:effectLst/>
-                  <a:latin typeface="Helvetica Neue"/>
-                </a:rPr>
-                <a:t>prepare </a:t>
-              </a:r>
-              <a:r>
-                <a:rPr kumimoji="0" lang="en-US" altLang="en-US" sz="2200" b="0" i="0" u="none" strike="noStrike" cap="none" normalizeH="0" baseline="0" dirty="0" smtClean="0">
-                  <a:ln>
-                    <a:noFill/>
-                  </a:ln>
-                  <a:solidFill>
-                    <a:srgbClr val="333333"/>
-                  </a:solidFill>
-                  <a:effectLst/>
-                  <a:latin typeface="Helvetica Neue"/>
-                </a:rPr>
-                <a:t>schematic</a:t>
+                <a:t>PART 1 - The prepare schematic</a:t>
               </a:r>
             </a:p>
             <a:p>
@@ -3298,33 +3272,7 @@
                   <a:effectLst/>
                   <a:latin typeface="Helvetica Neue"/>
                 </a:rPr>
-                <a:t>. This supply has to be </a:t>
-              </a:r>
-              <a:r>
-                <a:rPr kumimoji="0" lang="en-US" altLang="en-US" sz="1500" b="0" i="0" u="none" strike="noStrike" cap="none" normalizeH="0" baseline="0" dirty="0" smtClean="0">
-                  <a:ln>
-                    <a:noFill/>
-                  </a:ln>
-                  <a:solidFill>
-                    <a:srgbClr val="333333"/>
-                  </a:solidFill>
-                  <a:effectLst/>
-                  <a:latin typeface="Helvetica Neue"/>
-                </a:rPr>
-                <a:t>well </a:t>
-              </a:r>
-              <a:r>
-                <a:rPr kumimoji="0" lang="en-US" altLang="en-US" sz="1500" b="0" i="0" u="none" strike="noStrike" cap="none" normalizeH="0" baseline="0" dirty="0" smtClean="0">
-                  <a:ln>
-                    <a:noFill/>
-                  </a:ln>
-                  <a:solidFill>
-                    <a:srgbClr val="333333"/>
-                  </a:solidFill>
-                  <a:effectLst/>
-                  <a:latin typeface="Helvetica Neue"/>
-                </a:rPr>
-                <a:t>regulated with no voltage spikes</a:t>
+                <a:t>. This supply has to be well regulated with no voltage spikes</a:t>
               </a:r>
               <a:r>
                 <a:rPr kumimoji="0" lang="en-US" altLang="en-US" sz="1500" b="0" i="0" u="none" strike="noStrike" cap="none" normalizeH="0" dirty="0" smtClean="0">
@@ -3376,20 +3324,7 @@
                   <a:effectLst/>
                   <a:latin typeface="Helvetica Neue"/>
                 </a:rPr>
-                <a:t> </a:t>
-              </a:r>
-              <a:r>
-                <a:rPr kumimoji="0" lang="en-US" altLang="en-US" sz="1500" b="0" i="0" u="none" strike="noStrike" cap="none" normalizeH="0" baseline="0" dirty="0" smtClean="0">
-                  <a:ln>
-                    <a:noFill/>
-                  </a:ln>
-                  <a:solidFill>
-                    <a:srgbClr val="333333"/>
-                  </a:solidFill>
-                  <a:effectLst/>
-                  <a:latin typeface="Helvetica Neue"/>
-                </a:rPr>
-                <a:t>and </a:t>
+                <a:t> and </a:t>
               </a:r>
               <a:r>
                 <a:rPr kumimoji="0" lang="en-US" altLang="en-US" sz="1500" b="1" i="0" u="none" strike="noStrike" cap="none" normalizeH="0" baseline="0" dirty="0" smtClean="0">
@@ -3467,31 +3402,8 @@
                   <a:effectLst/>
                   <a:latin typeface="Helvetica Neue"/>
                 </a:rPr>
-                <a:t> </a:t>
+                <a:t> to it. </a:t>
               </a:r>
-              <a:r>
-                <a:rPr kumimoji="0" lang="en-US" altLang="en-US" sz="1500" b="0" i="0" u="none" strike="noStrike" cap="none" normalizeH="0" baseline="0" dirty="0" smtClean="0">
-                  <a:ln>
-                    <a:noFill/>
-                  </a:ln>
-                  <a:solidFill>
-                    <a:srgbClr val="333333"/>
-                  </a:solidFill>
-                  <a:effectLst/>
-                  <a:latin typeface="Helvetica Neue"/>
-                </a:rPr>
-                <a:t>to it. </a:t>
-              </a:r>
-              <a:endParaRPr kumimoji="0" lang="en-US" altLang="en-US" sz="1500" b="0" i="0" u="none" strike="noStrike" cap="none" normalizeH="0" baseline="0" dirty="0" smtClean="0">
-                <a:ln>
-                  <a:noFill/>
-                </a:ln>
-                <a:solidFill>
-                  <a:srgbClr val="333333"/>
-                </a:solidFill>
-                <a:effectLst/>
-                <a:latin typeface="Helvetica Neue"/>
-              </a:endParaRPr>
             </a:p>
             <a:p>
               <a:pPr marL="0" marR="0" lvl="0" indent="0" algn="l" defTabSz="914400" rtl="0" eaLnBrk="0" fontAlgn="base" latinLnBrk="0" hangingPunct="0">
@@ -3521,20 +3433,7 @@
                   <a:effectLst/>
                   <a:latin typeface="Helvetica Neue"/>
                 </a:rPr>
-                <a:t>To </a:t>
-              </a:r>
-              <a:r>
-                <a:rPr kumimoji="0" lang="en-US" altLang="en-US" sz="1500" b="0" i="0" u="none" strike="noStrike" cap="none" normalizeH="0" baseline="0" dirty="0" smtClean="0">
-                  <a:ln>
-                    <a:noFill/>
-                  </a:ln>
-                  <a:solidFill>
-                    <a:srgbClr val="333333"/>
-                  </a:solidFill>
-                  <a:effectLst/>
-                  <a:latin typeface="Helvetica Neue"/>
-                </a:rPr>
-                <a:t>reset</a:t>
+                <a:t>To reset</a:t>
               </a:r>
               <a:r>
                 <a:rPr lang="en-US" altLang="en-US" sz="1500" dirty="0" smtClean="0">
@@ -4031,20 +3930,7 @@
                   <a:effectLst/>
                   <a:latin typeface="Helvetica Neue"/>
                 </a:rPr>
-                <a:t>or </a:t>
-              </a:r>
-              <a:r>
-                <a:rPr kumimoji="0" lang="en-US" altLang="en-US" sz="1500" b="0" i="0" u="none" strike="noStrike" cap="none" normalizeH="0" baseline="0" dirty="0" smtClean="0">
-                  <a:ln>
-                    <a:noFill/>
-                  </a:ln>
-                  <a:solidFill>
-                    <a:srgbClr val="333333"/>
-                  </a:solidFill>
-                  <a:effectLst/>
-                  <a:latin typeface="Helvetica Neue"/>
-                </a:rPr>
-                <a:t>that, between pins 9 and 10 we place a </a:t>
+                <a:t>or that, between pins 9 and 10 we place a </a:t>
               </a:r>
               <a:r>
                 <a:rPr lang="en-US" altLang="en-US" sz="1500" b="1" dirty="0">
@@ -4079,20 +3965,7 @@
                   <a:effectLst/>
                   <a:latin typeface="Helvetica Neue"/>
                 </a:rPr>
-                <a:t>crystal. But this crystal, in order to oscillate needs two capacitors </a:t>
-              </a:r>
-              <a:r>
-                <a:rPr kumimoji="0" lang="en-US" altLang="en-US" sz="1500" b="0" i="0" u="none" strike="noStrike" cap="none" normalizeH="0" baseline="0" dirty="0" smtClean="0">
-                  <a:ln>
-                    <a:noFill/>
-                  </a:ln>
-                  <a:solidFill>
-                    <a:srgbClr val="333333"/>
-                  </a:solidFill>
-                  <a:effectLst/>
-                  <a:latin typeface="Helvetica Neue"/>
-                </a:rPr>
-                <a:t>of</a:t>
+                <a:t>crystal. But this crystal, in order to oscillate needs two capacitors of</a:t>
               </a:r>
               <a:r>
                 <a:rPr kumimoji="0" lang="en-US" altLang="en-US" sz="1500" b="1" i="0" u="none" strike="noStrike" cap="none" normalizeH="0" baseline="0" dirty="0" smtClean="0">
@@ -4588,7 +4461,7 @@
                 <a:effectLst/>
                 <a:latin typeface="Helvetica Neue"/>
               </a:rPr>
-              <a:t>Now, if the chip doesn't have the bootloader (virgin </a:t>
+              <a:t>Now, if the chip doesn't have the bootloader </a:t>
             </a:r>
             <a:r>
               <a:rPr kumimoji="0" lang="en-US" altLang="en-US" sz="1500" b="0" i="0" u="none" strike="noStrike" cap="none" normalizeH="0" baseline="0" dirty="0" smtClean="0">
@@ -4601,7 +4474,20 @@
                 <a:effectLst/>
                 <a:latin typeface="Helvetica Neue"/>
               </a:rPr>
-              <a:t>chip), you </a:t>
+              <a:t>(brand</a:t>
+            </a:r>
+            <a:r>
+              <a:rPr kumimoji="0" lang="en-US" altLang="en-US" sz="1500" b="0" i="0" u="none" strike="noStrike" cap="none" normalizeH="0" dirty="0" smtClean="0">
+                <a:ln>
+                  <a:noFill/>
+                </a:ln>
+                <a:solidFill>
+                  <a:srgbClr val="333333"/>
+                </a:solidFill>
+                <a:effectLst/>
+                <a:latin typeface="Helvetica Neue"/>
+              </a:rPr>
+              <a:t> new </a:t>
             </a:r>
             <a:r>
               <a:rPr kumimoji="0" lang="en-US" altLang="en-US" sz="1500" b="0" i="0" u="none" strike="noStrike" cap="none" normalizeH="0" baseline="0" dirty="0" smtClean="0">
@@ -4614,7 +4500,20 @@
                 <a:effectLst/>
                 <a:latin typeface="Helvetica Neue"/>
               </a:rPr>
-              <a:t>have to make next connections from an </a:t>
+              <a:t>chip</a:t>
+            </a:r>
+            <a:r>
+              <a:rPr kumimoji="0" lang="en-US" altLang="en-US" sz="1500" b="0" i="0" u="none" strike="noStrike" cap="none" normalizeH="0" baseline="0" dirty="0" smtClean="0">
+                <a:ln>
+                  <a:noFill/>
+                </a:ln>
+                <a:solidFill>
+                  <a:srgbClr val="333333"/>
+                </a:solidFill>
+                <a:effectLst/>
+                <a:latin typeface="Helvetica Neue"/>
+              </a:rPr>
+              <a:t>), you have to make next connections from an </a:t>
             </a:r>
             <a:r>
               <a:rPr kumimoji="0" lang="en-US" altLang="en-US" sz="1500" b="1" i="1" u="none" strike="noStrike" cap="none" normalizeH="0" baseline="0" dirty="0" smtClean="0">
@@ -4666,20 +4565,7 @@
                 <a:effectLst/>
                 <a:latin typeface="Helvetica Neue"/>
               </a:rPr>
-              <a:t>. </a:t>
-            </a:r>
-            <a:r>
-              <a:rPr kumimoji="0" lang="en-US" altLang="en-US" sz="1500" b="0" i="0" u="none" strike="noStrike" cap="none" normalizeH="0" baseline="0" dirty="0" smtClean="0">
-                <a:ln>
-                  <a:noFill/>
-                </a:ln>
-                <a:solidFill>
-                  <a:srgbClr val="333333"/>
-                </a:solidFill>
-                <a:effectLst/>
-                <a:latin typeface="Helvetica Neue"/>
-              </a:rPr>
-              <a:t>These are the SPI pins, CLOCK, MISO and MOSI.</a:t>
+              <a:t>. These are the SPI pins, CLOCK, MISO and MOSI.</a:t>
             </a:r>
             <a:endParaRPr kumimoji="0" lang="en-US" altLang="en-US" sz="1500" b="0" i="0" u="none" strike="noStrike" cap="none" normalizeH="0" baseline="0" dirty="0" smtClean="0">
               <a:ln>

</xml_diff>